<commit_message>
checking in SourceTree installation instsructions
</commit_message>
<xml_diff>
--- a/SourceTree Install Instructions.pptx
+++ b/SourceTree Install Instructions.pptx
@@ -15,14 +15,13 @@
     <p:sldId id="262" r:id="rId9"/>
     <p:sldId id="263" r:id="rId10"/>
     <p:sldId id="264" r:id="rId11"/>
-    <p:sldId id="265" r:id="rId12"/>
-    <p:sldId id="266" r:id="rId13"/>
-    <p:sldId id="267" r:id="rId14"/>
-    <p:sldId id="268" r:id="rId15"/>
-    <p:sldId id="269" r:id="rId16"/>
-    <p:sldId id="270" r:id="rId17"/>
-    <p:sldId id="271" r:id="rId18"/>
-    <p:sldId id="272" r:id="rId19"/>
+    <p:sldId id="266" r:id="rId12"/>
+    <p:sldId id="267" r:id="rId13"/>
+    <p:sldId id="268" r:id="rId14"/>
+    <p:sldId id="269" r:id="rId15"/>
+    <p:sldId id="270" r:id="rId16"/>
+    <p:sldId id="271" r:id="rId17"/>
+    <p:sldId id="272" r:id="rId18"/>
   </p:sldIdLst>
   <p:sldSz cx="12192000" cy="6858000"/>
   <p:notesSz cx="6858000" cy="9144000"/>
@@ -121,6 +120,11 @@
       </a:defRPr>
     </a:lvl9pPr>
   </p:defaultTextStyle>
+  <p:extLst>
+    <p:ext uri="{EFAFB233-063F-42B5-8137-9DF3F51BA10A}">
+      <p15:sldGuideLst xmlns:p15="http://schemas.microsoft.com/office/powerpoint/2012/main"/>
+    </p:ext>
+  </p:extLst>
 </p:presentation>
 </file>
 
@@ -169,7 +173,6 @@
               <a:rPr lang="en-US"/>
               <a:t>Click to edit Master title style</a:t>
             </a:r>
-            <a:endParaRPr lang="en-US"/>
           </a:p>
         </p:txBody>
       </p:sp>
@@ -234,7 +237,6 @@
               <a:rPr lang="en-US"/>
               <a:t>Click to edit Master subtitle style</a:t>
             </a:r>
-            <a:endParaRPr lang="en-US"/>
           </a:p>
         </p:txBody>
       </p:sp>
@@ -352,7 +354,6 @@
               <a:rPr lang="en-US"/>
               <a:t>Click to edit Master title style</a:t>
             </a:r>
-            <a:endParaRPr lang="en-US"/>
           </a:p>
         </p:txBody>
       </p:sp>
@@ -404,7 +405,6 @@
               <a:rPr lang="en-US"/>
               <a:t>Fifth level</a:t>
             </a:r>
-            <a:endParaRPr lang="en-US"/>
           </a:p>
         </p:txBody>
       </p:sp>
@@ -527,7 +527,6 @@
               <a:rPr lang="en-US"/>
               <a:t>Click to edit Master title style</a:t>
             </a:r>
-            <a:endParaRPr lang="en-US"/>
           </a:p>
         </p:txBody>
       </p:sp>
@@ -584,7 +583,6 @@
               <a:rPr lang="en-US"/>
               <a:t>Fifth level</a:t>
             </a:r>
-            <a:endParaRPr lang="en-US"/>
           </a:p>
         </p:txBody>
       </p:sp>
@@ -702,7 +700,6 @@
               <a:rPr lang="en-US"/>
               <a:t>Click to edit Master title style</a:t>
             </a:r>
-            <a:endParaRPr lang="en-US"/>
           </a:p>
         </p:txBody>
       </p:sp>
@@ -754,7 +751,6 @@
               <a:rPr lang="en-US"/>
               <a:t>Fifth level</a:t>
             </a:r>
-            <a:endParaRPr lang="en-US"/>
           </a:p>
         </p:txBody>
       </p:sp>
@@ -881,7 +877,6 @@
               <a:rPr lang="en-US"/>
               <a:t>Click to edit Master title style</a:t>
             </a:r>
-            <a:endParaRPr lang="en-US"/>
           </a:p>
         </p:txBody>
       </p:sp>
@@ -1118,7 +1113,6 @@
               <a:rPr lang="en-US"/>
               <a:t>Click to edit Master title style</a:t>
             </a:r>
-            <a:endParaRPr lang="en-US"/>
           </a:p>
         </p:txBody>
       </p:sp>
@@ -1175,7 +1169,6 @@
               <a:rPr lang="en-US"/>
               <a:t>Fifth level</a:t>
             </a:r>
-            <a:endParaRPr lang="en-US"/>
           </a:p>
         </p:txBody>
       </p:sp>
@@ -1232,7 +1225,6 @@
               <a:rPr lang="en-US"/>
               <a:t>Fifth level</a:t>
             </a:r>
-            <a:endParaRPr lang="en-US"/>
           </a:p>
         </p:txBody>
       </p:sp>
@@ -1355,7 +1347,6 @@
               <a:rPr lang="en-US"/>
               <a:t>Click to edit Master title style</a:t>
             </a:r>
-            <a:endParaRPr lang="en-US"/>
           </a:p>
         </p:txBody>
       </p:sp>
@@ -1477,7 +1468,6 @@
               <a:rPr lang="en-US"/>
               <a:t>Fifth level</a:t>
             </a:r>
-            <a:endParaRPr lang="en-US"/>
           </a:p>
         </p:txBody>
       </p:sp>
@@ -1599,7 +1589,6 @@
               <a:rPr lang="en-US"/>
               <a:t>Fifth level</a:t>
             </a:r>
-            <a:endParaRPr lang="en-US"/>
           </a:p>
         </p:txBody>
       </p:sp>
@@ -1717,7 +1706,6 @@
               <a:rPr lang="en-US"/>
               <a:t>Click to edit Master title style</a:t>
             </a:r>
-            <a:endParaRPr lang="en-US"/>
           </a:p>
         </p:txBody>
       </p:sp>
@@ -1939,7 +1927,6 @@
               <a:rPr lang="en-US"/>
               <a:t>Click to edit Master title style</a:t>
             </a:r>
-            <a:endParaRPr lang="en-US"/>
           </a:p>
         </p:txBody>
       </p:sp>
@@ -2024,7 +2011,6 @@
               <a:rPr lang="en-US"/>
               <a:t>Fifth level</a:t>
             </a:r>
-            <a:endParaRPr lang="en-US"/>
           </a:p>
         </p:txBody>
       </p:sp>
@@ -2216,7 +2202,6 @@
               <a:rPr lang="en-US"/>
               <a:t>Click to edit Master title style</a:t>
             </a:r>
-            <a:endParaRPr lang="en-US"/>
           </a:p>
         </p:txBody>
       </p:sp>
@@ -2475,7 +2460,6 @@
               <a:rPr lang="en-US"/>
               <a:t>Click to edit Master title style</a:t>
             </a:r>
-            <a:endParaRPr lang="en-US"/>
           </a:p>
         </p:txBody>
       </p:sp>
@@ -2537,7 +2521,6 @@
               <a:rPr lang="en-US"/>
               <a:t>Fifth level</a:t>
             </a:r>
-            <a:endParaRPr lang="en-US"/>
           </a:p>
         </p:txBody>
       </p:sp>
@@ -3084,6 +3067,128 @@
           </a:prstGeom>
         </p:spPr>
       </p:pic>
+      <p:sp>
+        <p:nvSpPr>
+          <p:cNvPr id="3" name="TextBox 2"/>
+          <p:cNvSpPr txBox="1"/>
+          <p:nvPr/>
+        </p:nvSpPr>
+        <p:spPr>
+          <a:xfrm>
+            <a:off x="1967754" y="6027003"/>
+            <a:ext cx="8256491" cy="830997"/>
+          </a:xfrm>
+          <a:prstGeom prst="rect">
+            <a:avLst/>
+          </a:prstGeom>
+          <a:noFill/>
+        </p:spPr>
+        <p:txBody>
+          <a:bodyPr wrap="none" rtlCol="0">
+            <a:spAutoFit/>
+          </a:bodyPr>
+          <a:lstStyle/>
+          <a:p>
+            <a:r>
+              <a:rPr lang="en-US" sz="2400" b="1" dirty="0">
+                <a:solidFill>
+                  <a:srgbClr val="FF0000"/>
+                </a:solidFill>
+              </a:rPr>
+              <a:t>6. If you don’t have an </a:t>
+            </a:r>
+            <a:r>
+              <a:rPr lang="en-US" sz="2400" b="1" dirty="0" err="1">
+                <a:solidFill>
+                  <a:srgbClr val="FF0000"/>
+                </a:solidFill>
+              </a:rPr>
+              <a:t>Altassian</a:t>
+            </a:r>
+            <a:r>
+              <a:rPr lang="en-US" sz="2400" b="1" dirty="0">
+                <a:solidFill>
+                  <a:srgbClr val="FF0000"/>
+                </a:solidFill>
+              </a:rPr>
+              <a:t> Account, create one by clicking</a:t>
+            </a:r>
+          </a:p>
+          <a:p>
+            <a:pPr algn="ctr"/>
+            <a:r>
+              <a:rPr lang="en-US" sz="2400" b="1" dirty="0">
+                <a:solidFill>
+                  <a:srgbClr val="FF0000"/>
+                </a:solidFill>
+              </a:rPr>
+              <a:t>“Go to My </a:t>
+            </a:r>
+            <a:r>
+              <a:rPr lang="en-US" sz="2400" b="1" dirty="0" err="1">
+                <a:solidFill>
+                  <a:srgbClr val="FF0000"/>
+                </a:solidFill>
+              </a:rPr>
+              <a:t>Atlassian</a:t>
+            </a:r>
+            <a:r>
+              <a:rPr lang="en-US" sz="2400" b="1" dirty="0">
+                <a:solidFill>
+                  <a:srgbClr val="FF0000"/>
+                </a:solidFill>
+              </a:rPr>
+              <a:t>”</a:t>
+            </a:r>
+          </a:p>
+        </p:txBody>
+      </p:sp>
+      <p:sp>
+        <p:nvSpPr>
+          <p:cNvPr id="4" name="Rectangle: Rounded Corners 3"/>
+          <p:cNvSpPr/>
+          <p:nvPr/>
+        </p:nvSpPr>
+        <p:spPr>
+          <a:xfrm>
+            <a:off x="8036168" y="5231424"/>
+            <a:ext cx="2092570" cy="606668"/>
+          </a:xfrm>
+          <a:prstGeom prst="roundRect">
+            <a:avLst/>
+          </a:prstGeom>
+          <a:noFill/>
+          <a:ln w="57150">
+            <a:solidFill>
+              <a:srgbClr val="FFC000"/>
+            </a:solidFill>
+          </a:ln>
+        </p:spPr>
+        <p:style>
+          <a:lnRef idx="2">
+            <a:schemeClr val="accent1">
+              <a:shade val="50000"/>
+            </a:schemeClr>
+          </a:lnRef>
+          <a:fillRef idx="1">
+            <a:schemeClr val="accent1"/>
+          </a:fillRef>
+          <a:effectRef idx="0">
+            <a:schemeClr val="accent1"/>
+          </a:effectRef>
+          <a:fontRef idx="minor">
+            <a:schemeClr val="lt1"/>
+          </a:fontRef>
+        </p:style>
+        <p:txBody>
+          <a:bodyPr rtlCol="0" anchor="ctr"/>
+          <a:lstStyle/>
+          <a:p>
+            <a:pPr algn="ctr"/>
+            <a:endParaRPr lang="en-US"/>
+          </a:p>
+        </p:txBody>
+      </p:sp>
     </p:spTree>
     <p:extLst>
       <p:ext uri="{BB962C8B-B14F-4D97-AF65-F5344CB8AC3E}">
@@ -3130,8 +3235,8 @@
         </p:blipFill>
         <p:spPr>
           <a:xfrm>
-            <a:off x="1809750" y="809625"/>
-            <a:ext cx="8572500" cy="5238750"/>
+            <a:off x="0" y="158750"/>
+            <a:ext cx="12192000" cy="6540500"/>
           </a:xfrm>
           <a:prstGeom prst="rect">
             <a:avLst/>
@@ -3146,8 +3251,8 @@
         </p:nvSpPr>
         <p:spPr>
           <a:xfrm>
-            <a:off x="8036168" y="5231424"/>
-            <a:ext cx="2092570" cy="606668"/>
+            <a:off x="5231423" y="4695092"/>
+            <a:ext cx="1793631" cy="615462"/>
           </a:xfrm>
           <a:prstGeom prst="roundRect">
             <a:avLst/>
@@ -3184,10 +3289,43 @@
           </a:p>
         </p:txBody>
       </p:sp>
+      <p:sp>
+        <p:nvSpPr>
+          <p:cNvPr id="4" name="TextBox 3"/>
+          <p:cNvSpPr txBox="1"/>
+          <p:nvPr/>
+        </p:nvSpPr>
+        <p:spPr>
+          <a:xfrm>
+            <a:off x="3427278" y="6237585"/>
+            <a:ext cx="5721887" cy="461665"/>
+          </a:xfrm>
+          <a:prstGeom prst="rect">
+            <a:avLst/>
+          </a:prstGeom>
+          <a:noFill/>
+        </p:spPr>
+        <p:txBody>
+          <a:bodyPr wrap="none" rtlCol="0">
+            <a:spAutoFit/>
+          </a:bodyPr>
+          <a:lstStyle/>
+          <a:p>
+            <a:r>
+              <a:rPr lang="en-US" sz="2400" b="1" dirty="0">
+                <a:solidFill>
+                  <a:srgbClr val="FF0000"/>
+                </a:solidFill>
+              </a:rPr>
+              <a:t>7. If you don’t have an account create one.</a:t>
+            </a:r>
+          </a:p>
+        </p:txBody>
+      </p:sp>
     </p:spTree>
     <p:extLst>
       <p:ext uri="{BB962C8B-B14F-4D97-AF65-F5344CB8AC3E}">
-        <p14:creationId xmlns:p14="http://schemas.microsoft.com/office/powerpoint/2010/main" val="1899859593"/>
+        <p14:creationId xmlns:p14="http://schemas.microsoft.com/office/powerpoint/2010/main" val="1903560283"/>
       </p:ext>
     </p:extLst>
   </p:cSld>
@@ -3230,8 +3368,8 @@
         </p:blipFill>
         <p:spPr>
           <a:xfrm>
-            <a:off x="0" y="158750"/>
-            <a:ext cx="12192000" cy="6540500"/>
+            <a:off x="1809750" y="809625"/>
+            <a:ext cx="8572500" cy="5238750"/>
           </a:xfrm>
           <a:prstGeom prst="rect">
             <a:avLst/>
@@ -3240,54 +3378,41 @@
       </p:pic>
       <p:sp>
         <p:nvSpPr>
-          <p:cNvPr id="3" name="Rectangle: Rounded Corners 2"/>
-          <p:cNvSpPr/>
+          <p:cNvPr id="3" name="TextBox 2"/>
+          <p:cNvSpPr txBox="1"/>
           <p:nvPr/>
         </p:nvSpPr>
         <p:spPr>
           <a:xfrm>
-            <a:off x="5231423" y="4695092"/>
-            <a:ext cx="1793631" cy="615462"/>
-          </a:xfrm>
-          <a:prstGeom prst="roundRect">
+            <a:off x="2402520" y="6082812"/>
+            <a:ext cx="7386959" cy="461665"/>
+          </a:xfrm>
+          <a:prstGeom prst="rect">
             <a:avLst/>
           </a:prstGeom>
           <a:noFill/>
-          <a:ln w="57150">
-            <a:solidFill>
-              <a:srgbClr val="FFC000"/>
-            </a:solidFill>
-          </a:ln>
-        </p:spPr>
-        <p:style>
-          <a:lnRef idx="2">
-            <a:schemeClr val="accent1">
-              <a:shade val="50000"/>
-            </a:schemeClr>
-          </a:lnRef>
-          <a:fillRef idx="1">
-            <a:schemeClr val="accent1"/>
-          </a:fillRef>
-          <a:effectRef idx="0">
-            <a:schemeClr val="accent1"/>
-          </a:effectRef>
-          <a:fontRef idx="minor">
-            <a:schemeClr val="lt1"/>
-          </a:fontRef>
-        </p:style>
-        <p:txBody>
-          <a:bodyPr rtlCol="0" anchor="ctr"/>
-          <a:lstStyle/>
-          <a:p>
-            <a:pPr algn="ctr"/>
-            <a:endParaRPr lang="en-US"/>
+        </p:spPr>
+        <p:txBody>
+          <a:bodyPr wrap="none" rtlCol="0">
+            <a:spAutoFit/>
+          </a:bodyPr>
+          <a:lstStyle/>
+          <a:p>
+            <a:r>
+              <a:rPr lang="en-US" sz="2400" b="1" dirty="0">
+                <a:solidFill>
+                  <a:srgbClr val="FF0000"/>
+                </a:solidFill>
+              </a:rPr>
+              <a:t>8. You should get to this screen after creating an account</a:t>
+            </a:r>
           </a:p>
         </p:txBody>
       </p:sp>
     </p:spTree>
     <p:extLst>
       <p:ext uri="{BB962C8B-B14F-4D97-AF65-F5344CB8AC3E}">
-        <p14:creationId xmlns:p14="http://schemas.microsoft.com/office/powerpoint/2010/main" val="1903560283"/>
+        <p14:creationId xmlns:p14="http://schemas.microsoft.com/office/powerpoint/2010/main" val="3129163995"/>
       </p:ext>
     </p:extLst>
   </p:cSld>
@@ -3338,10 +3463,89 @@
           </a:prstGeom>
         </p:spPr>
       </p:pic>
+      <p:sp>
+        <p:nvSpPr>
+          <p:cNvPr id="3" name="Rectangle: Rounded Corners 2"/>
+          <p:cNvSpPr/>
+          <p:nvPr/>
+        </p:nvSpPr>
+        <p:spPr>
+          <a:xfrm>
+            <a:off x="4572000" y="5205046"/>
+            <a:ext cx="1793631" cy="615462"/>
+          </a:xfrm>
+          <a:prstGeom prst="roundRect">
+            <a:avLst/>
+          </a:prstGeom>
+          <a:noFill/>
+          <a:ln w="57150">
+            <a:solidFill>
+              <a:srgbClr val="FFC000"/>
+            </a:solidFill>
+          </a:ln>
+        </p:spPr>
+        <p:style>
+          <a:lnRef idx="2">
+            <a:schemeClr val="accent1">
+              <a:shade val="50000"/>
+            </a:schemeClr>
+          </a:lnRef>
+          <a:fillRef idx="1">
+            <a:schemeClr val="accent1"/>
+          </a:fillRef>
+          <a:effectRef idx="0">
+            <a:schemeClr val="accent1"/>
+          </a:effectRef>
+          <a:fontRef idx="minor">
+            <a:schemeClr val="lt1"/>
+          </a:fontRef>
+        </p:style>
+        <p:txBody>
+          <a:bodyPr rtlCol="0" anchor="ctr"/>
+          <a:lstStyle/>
+          <a:p>
+            <a:pPr algn="ctr"/>
+            <a:endParaRPr lang="en-US"/>
+          </a:p>
+        </p:txBody>
+      </p:sp>
+      <p:sp>
+        <p:nvSpPr>
+          <p:cNvPr id="4" name="TextBox 3"/>
+          <p:cNvSpPr txBox="1"/>
+          <p:nvPr/>
+        </p:nvSpPr>
+        <p:spPr>
+          <a:xfrm>
+            <a:off x="4921896" y="6202849"/>
+            <a:ext cx="2348207" cy="461665"/>
+          </a:xfrm>
+          <a:prstGeom prst="rect">
+            <a:avLst/>
+          </a:prstGeom>
+          <a:noFill/>
+        </p:spPr>
+        <p:txBody>
+          <a:bodyPr wrap="none" rtlCol="0">
+            <a:spAutoFit/>
+          </a:bodyPr>
+          <a:lstStyle/>
+          <a:p>
+            <a:r>
+              <a:rPr lang="en-US" sz="2400" b="1" dirty="0">
+                <a:solidFill>
+                  <a:srgbClr val="FF0000"/>
+                </a:solidFill>
+              </a:rPr>
+              <a:t>9. Skip this setup</a:t>
+            </a:r>
+          </a:p>
+        </p:txBody>
+      </p:sp>
     </p:spTree>
     <p:extLst>
       <p:ext uri="{BB962C8B-B14F-4D97-AF65-F5344CB8AC3E}">
-        <p14:creationId xmlns:p14="http://schemas.microsoft.com/office/powerpoint/2010/main" val="3129163995"/>
+        <p14:creationId xmlns:p14="http://schemas.microsoft.com/office/powerpoint/2010/main" val="1451071674"/>
       </p:ext>
     </p:extLst>
   </p:cSld>
@@ -3384,8 +3588,8 @@
         </p:blipFill>
         <p:spPr>
           <a:xfrm>
-            <a:off x="1809750" y="809625"/>
-            <a:ext cx="8572500" cy="5238750"/>
+            <a:off x="3414712" y="2605087"/>
+            <a:ext cx="5362575" cy="1647825"/>
           </a:xfrm>
           <a:prstGeom prst="rect">
             <a:avLst/>
@@ -3400,8 +3604,8 @@
         </p:nvSpPr>
         <p:spPr>
           <a:xfrm>
-            <a:off x="4572000" y="5205046"/>
-            <a:ext cx="1793631" cy="615462"/>
+            <a:off x="7965831" y="3754315"/>
+            <a:ext cx="811456" cy="498598"/>
           </a:xfrm>
           <a:prstGeom prst="roundRect">
             <a:avLst/>
@@ -3438,10 +3642,43 @@
           </a:p>
         </p:txBody>
       </p:sp>
+      <p:sp>
+        <p:nvSpPr>
+          <p:cNvPr id="4" name="TextBox 3"/>
+          <p:cNvSpPr txBox="1"/>
+          <p:nvPr/>
+        </p:nvSpPr>
+        <p:spPr>
+          <a:xfrm>
+            <a:off x="3515199" y="4831249"/>
+            <a:ext cx="5664243" cy="461665"/>
+          </a:xfrm>
+          <a:prstGeom prst="rect">
+            <a:avLst/>
+          </a:prstGeom>
+          <a:noFill/>
+        </p:spPr>
+        <p:txBody>
+          <a:bodyPr wrap="none" rtlCol="0">
+            <a:spAutoFit/>
+          </a:bodyPr>
+          <a:lstStyle/>
+          <a:p>
+            <a:r>
+              <a:rPr lang="en-US" sz="2400" b="1" dirty="0">
+                <a:solidFill>
+                  <a:srgbClr val="FF0000"/>
+                </a:solidFill>
+              </a:rPr>
+              <a:t>10. You udo not have an SSH key, click “no”</a:t>
+            </a:r>
+          </a:p>
+        </p:txBody>
+      </p:sp>
     </p:spTree>
     <p:extLst>
       <p:ext uri="{BB962C8B-B14F-4D97-AF65-F5344CB8AC3E}">
-        <p14:creationId xmlns:p14="http://schemas.microsoft.com/office/powerpoint/2010/main" val="1451071674"/>
+        <p14:creationId xmlns:p14="http://schemas.microsoft.com/office/powerpoint/2010/main" val="2588697855"/>
       </p:ext>
     </p:extLst>
   </p:cSld>
@@ -3484,8 +3721,8 @@
         </p:blipFill>
         <p:spPr>
           <a:xfrm>
-            <a:off x="3414712" y="2605087"/>
-            <a:ext cx="5362575" cy="1647825"/>
+            <a:off x="2862262" y="1490662"/>
+            <a:ext cx="6467475" cy="3876675"/>
           </a:xfrm>
           <a:prstGeom prst="rect">
             <a:avLst/>
@@ -3500,8 +3737,8 @@
         </p:nvSpPr>
         <p:spPr>
           <a:xfrm>
-            <a:off x="7965831" y="3754315"/>
-            <a:ext cx="811456" cy="498598"/>
+            <a:off x="3305907" y="2760783"/>
+            <a:ext cx="5934807" cy="914401"/>
           </a:xfrm>
           <a:prstGeom prst="roundRect">
             <a:avLst/>
@@ -3538,10 +3775,75 @@
           </a:p>
         </p:txBody>
       </p:sp>
+      <p:sp>
+        <p:nvSpPr>
+          <p:cNvPr id="4" name="TextBox 3"/>
+          <p:cNvSpPr txBox="1"/>
+          <p:nvPr/>
+        </p:nvSpPr>
+        <p:spPr>
+          <a:xfrm>
+            <a:off x="1429387" y="5982581"/>
+            <a:ext cx="9687845" cy="461665"/>
+          </a:xfrm>
+          <a:prstGeom prst="rect">
+            <a:avLst/>
+          </a:prstGeom>
+          <a:noFill/>
+        </p:spPr>
+        <p:txBody>
+          <a:bodyPr wrap="none" rtlCol="0">
+            <a:spAutoFit/>
+          </a:bodyPr>
+          <a:lstStyle/>
+          <a:p>
+            <a:r>
+              <a:rPr lang="en-US" sz="2400" b="1" dirty="0">
+                <a:solidFill>
+                  <a:srgbClr val="FF0000"/>
+                </a:solidFill>
+              </a:rPr>
+              <a:t>11.  Download an embedded version of </a:t>
+            </a:r>
+            <a:r>
+              <a:rPr lang="en-US" sz="2400" b="1" dirty="0" err="1">
+                <a:solidFill>
+                  <a:srgbClr val="FF0000"/>
+                </a:solidFill>
+              </a:rPr>
+              <a:t>Git</a:t>
+            </a:r>
+            <a:r>
+              <a:rPr lang="en-US" sz="2400" b="1" dirty="0">
+                <a:solidFill>
+                  <a:srgbClr val="FF0000"/>
+                </a:solidFill>
+              </a:rPr>
+              <a:t> for </a:t>
+            </a:r>
+            <a:r>
+              <a:rPr lang="en-US" sz="2400" b="1" dirty="0" err="1">
+                <a:solidFill>
+                  <a:srgbClr val="FF0000"/>
+                </a:solidFill>
+              </a:rPr>
+              <a:t>SourceTree</a:t>
+            </a:r>
+            <a:r>
+              <a:rPr lang="en-US" sz="2400" b="1" dirty="0">
+                <a:solidFill>
+                  <a:srgbClr val="FF0000"/>
+                </a:solidFill>
+              </a:rPr>
+              <a:t> when prompted</a:t>
+            </a:r>
+          </a:p>
+        </p:txBody>
+      </p:sp>
     </p:spTree>
     <p:extLst>
       <p:ext uri="{BB962C8B-B14F-4D97-AF65-F5344CB8AC3E}">
-        <p14:creationId xmlns:p14="http://schemas.microsoft.com/office/powerpoint/2010/main" val="2588697855"/>
+        <p14:creationId xmlns:p14="http://schemas.microsoft.com/office/powerpoint/2010/main" val="3326800224"/>
       </p:ext>
     </p:extLst>
   </p:cSld>
@@ -3584,8 +3886,8 @@
         </p:blipFill>
         <p:spPr>
           <a:xfrm>
-            <a:off x="2862262" y="1490662"/>
-            <a:ext cx="6467475" cy="3876675"/>
+            <a:off x="2862262" y="1357312"/>
+            <a:ext cx="6467475" cy="4143375"/>
           </a:xfrm>
           <a:prstGeom prst="rect">
             <a:avLst/>
@@ -3600,7 +3902,7 @@
         </p:nvSpPr>
         <p:spPr>
           <a:xfrm>
-            <a:off x="3305907" y="2760783"/>
+            <a:off x="3305907" y="2664071"/>
             <a:ext cx="5934807" cy="914401"/>
           </a:xfrm>
           <a:prstGeom prst="roundRect">
@@ -3638,10 +3940,59 @@
           </a:p>
         </p:txBody>
       </p:sp>
+      <p:sp>
+        <p:nvSpPr>
+          <p:cNvPr id="4" name="TextBox 3"/>
+          <p:cNvSpPr txBox="1"/>
+          <p:nvPr/>
+        </p:nvSpPr>
+        <p:spPr>
+          <a:xfrm>
+            <a:off x="1035626" y="5921496"/>
+            <a:ext cx="10475368" cy="461665"/>
+          </a:xfrm>
+          <a:prstGeom prst="rect">
+            <a:avLst/>
+          </a:prstGeom>
+          <a:noFill/>
+        </p:spPr>
+        <p:txBody>
+          <a:bodyPr wrap="none" rtlCol="0">
+            <a:spAutoFit/>
+          </a:bodyPr>
+          <a:lstStyle/>
+          <a:p>
+            <a:r>
+              <a:rPr lang="en-US" sz="2400" b="1" dirty="0">
+                <a:solidFill>
+                  <a:srgbClr val="FF0000"/>
+                </a:solidFill>
+              </a:rPr>
+              <a:t>12. Download an embedded version of Mercurial for </a:t>
+            </a:r>
+            <a:r>
+              <a:rPr lang="en-US" sz="2400" b="1" dirty="0" err="1">
+                <a:solidFill>
+                  <a:srgbClr val="FF0000"/>
+                </a:solidFill>
+              </a:rPr>
+              <a:t>SourceTree</a:t>
+            </a:r>
+            <a:r>
+              <a:rPr lang="en-US" sz="2400" b="1" dirty="0">
+                <a:solidFill>
+                  <a:srgbClr val="FF0000"/>
+                </a:solidFill>
+              </a:rPr>
+              <a:t> when prompted.</a:t>
+            </a:r>
+          </a:p>
+        </p:txBody>
+      </p:sp>
     </p:spTree>
     <p:extLst>
       <p:ext uri="{BB962C8B-B14F-4D97-AF65-F5344CB8AC3E}">
-        <p14:creationId xmlns:p14="http://schemas.microsoft.com/office/powerpoint/2010/main" val="3326800224"/>
+        <p14:creationId xmlns:p14="http://schemas.microsoft.com/office/powerpoint/2010/main" val="930845585"/>
       </p:ext>
     </p:extLst>
   </p:cSld>
@@ -3684,8 +4035,8 @@
         </p:blipFill>
         <p:spPr>
           <a:xfrm>
-            <a:off x="2862262" y="1357312"/>
-            <a:ext cx="6467475" cy="4143375"/>
+            <a:off x="1331303" y="1342381"/>
+            <a:ext cx="10022497" cy="5376652"/>
           </a:xfrm>
           <a:prstGeom prst="rect">
             <a:avLst/>
@@ -3694,126 +4045,59 @@
       </p:pic>
       <p:sp>
         <p:nvSpPr>
-          <p:cNvPr id="3" name="Rectangle: Rounded Corners 2"/>
-          <p:cNvSpPr/>
+          <p:cNvPr id="3" name="Title 2"/>
+          <p:cNvSpPr>
+            <a:spLocks noGrp="1"/>
+          </p:cNvSpPr>
+          <p:nvPr>
+            <p:ph type="title"/>
+          </p:nvPr>
+        </p:nvSpPr>
+        <p:spPr/>
+        <p:txBody>
+          <a:bodyPr/>
+          <a:lstStyle/>
+          <a:p>
+            <a:r>
+              <a:rPr lang="en-US" dirty="0" err="1"/>
+              <a:t>SourceTree</a:t>
+            </a:r>
+            <a:r>
+              <a:rPr lang="en-US" dirty="0"/>
+              <a:t> is Installed!</a:t>
+            </a:r>
+          </a:p>
+        </p:txBody>
+      </p:sp>
+      <p:sp>
+        <p:nvSpPr>
+          <p:cNvPr id="4" name="TextBox 3"/>
+          <p:cNvSpPr txBox="1"/>
           <p:nvPr/>
         </p:nvSpPr>
         <p:spPr>
           <a:xfrm>
-            <a:off x="3305907" y="2664071"/>
-            <a:ext cx="5934807" cy="914401"/>
-          </a:xfrm>
-          <a:prstGeom prst="roundRect">
+            <a:off x="4881404" y="6106134"/>
+            <a:ext cx="2429191" cy="461665"/>
+          </a:xfrm>
+          <a:prstGeom prst="rect">
             <a:avLst/>
           </a:prstGeom>
           <a:noFill/>
-          <a:ln w="57150">
-            <a:solidFill>
-              <a:srgbClr val="FFC000"/>
-            </a:solidFill>
-          </a:ln>
-        </p:spPr>
-        <p:style>
-          <a:lnRef idx="2">
-            <a:schemeClr val="accent1">
-              <a:shade val="50000"/>
-            </a:schemeClr>
-          </a:lnRef>
-          <a:fillRef idx="1">
-            <a:schemeClr val="accent1"/>
-          </a:fillRef>
-          <a:effectRef idx="0">
-            <a:schemeClr val="accent1"/>
-          </a:effectRef>
-          <a:fontRef idx="minor">
-            <a:schemeClr val="lt1"/>
-          </a:fontRef>
-        </p:style>
-        <p:txBody>
-          <a:bodyPr rtlCol="0" anchor="ctr"/>
-          <a:lstStyle/>
-          <a:p>
-            <a:pPr algn="ctr"/>
-            <a:endParaRPr lang="en-US"/>
-          </a:p>
-        </p:txBody>
-      </p:sp>
-    </p:spTree>
-    <p:extLst>
-      <p:ext uri="{BB962C8B-B14F-4D97-AF65-F5344CB8AC3E}">
-        <p14:creationId xmlns:p14="http://schemas.microsoft.com/office/powerpoint/2010/main" val="930845585"/>
-      </p:ext>
-    </p:extLst>
-  </p:cSld>
-  <p:clrMapOvr>
-    <a:masterClrMapping/>
-  </p:clrMapOvr>
-</p:sld>
-</file>
-
-<file path=ppt/slides/slide18.xml><?xml version="1.0" encoding="utf-8"?>
-<p:sld xmlns:a="http://schemas.openxmlformats.org/drawingml/2006/main" xmlns:r="http://schemas.openxmlformats.org/officeDocument/2006/relationships" xmlns:p="http://schemas.openxmlformats.org/presentationml/2006/main">
-  <p:cSld>
-    <p:spTree>
-      <p:nvGrpSpPr>
-        <p:cNvPr id="1" name=""/>
-        <p:cNvGrpSpPr/>
-        <p:nvPr/>
-      </p:nvGrpSpPr>
-      <p:grpSpPr>
-        <a:xfrm>
-          <a:off x="0" y="0"/>
-          <a:ext cx="0" cy="0"/>
-          <a:chOff x="0" y="0"/>
-          <a:chExt cx="0" cy="0"/>
-        </a:xfrm>
-      </p:grpSpPr>
-      <p:pic>
-        <p:nvPicPr>
-          <p:cNvPr id="2" name="Picture 1"/>
-          <p:cNvPicPr>
-            <a:picLocks noChangeAspect="1"/>
-          </p:cNvPicPr>
-          <p:nvPr/>
-        </p:nvPicPr>
-        <p:blipFill>
-          <a:blip r:embed="rId2"/>
-          <a:stretch>
-            <a:fillRect/>
-          </a:stretch>
-        </p:blipFill>
-        <p:spPr>
-          <a:xfrm>
-            <a:off x="1331303" y="1342381"/>
-            <a:ext cx="10022497" cy="5376652"/>
-          </a:xfrm>
-          <a:prstGeom prst="rect">
-            <a:avLst/>
-          </a:prstGeom>
-        </p:spPr>
-      </p:pic>
-      <p:sp>
-        <p:nvSpPr>
-          <p:cNvPr id="3" name="Title 2"/>
-          <p:cNvSpPr>
-            <a:spLocks noGrp="1"/>
-          </p:cNvSpPr>
-          <p:nvPr>
-            <p:ph type="title"/>
-          </p:nvPr>
-        </p:nvSpPr>
-        <p:spPr/>
-        <p:txBody>
-          <a:bodyPr/>
-          <a:lstStyle/>
-          <a:p>
-            <a:r>
-              <a:rPr lang="en-US" dirty="0" err="1"/>
-              <a:t>SourceTree</a:t>
-            </a:r>
-            <a:r>
-              <a:rPr lang="en-US" dirty="0"/>
-              <a:t> is Installed!</a:t>
+        </p:spPr>
+        <p:txBody>
+          <a:bodyPr wrap="none" rtlCol="0">
+            <a:spAutoFit/>
+          </a:bodyPr>
+          <a:lstStyle/>
+          <a:p>
+            <a:r>
+              <a:rPr lang="en-US" sz="2400" b="1" dirty="0">
+                <a:solidFill>
+                  <a:srgbClr val="FF0000"/>
+                </a:solidFill>
+              </a:rPr>
+              <a:t>That should be it!</a:t>
             </a:r>
           </a:p>
         </p:txBody>
@@ -3965,6 +4249,39 @@
           </a:prstGeom>
         </p:spPr>
       </p:pic>
+      <p:sp>
+        <p:nvSpPr>
+          <p:cNvPr id="2" name="TextBox 1"/>
+          <p:cNvSpPr txBox="1"/>
+          <p:nvPr/>
+        </p:nvSpPr>
+        <p:spPr>
+          <a:xfrm>
+            <a:off x="3508131" y="6172200"/>
+            <a:ext cx="4484048" cy="461665"/>
+          </a:xfrm>
+          <a:prstGeom prst="rect">
+            <a:avLst/>
+          </a:prstGeom>
+          <a:noFill/>
+        </p:spPr>
+        <p:txBody>
+          <a:bodyPr wrap="none" rtlCol="0">
+            <a:spAutoFit/>
+          </a:bodyPr>
+          <a:lstStyle/>
+          <a:p>
+            <a:r>
+              <a:rPr lang="en-US" sz="2400" b="1" dirty="0">
+                <a:solidFill>
+                  <a:srgbClr val="FF0000"/>
+                </a:solidFill>
+              </a:rPr>
+              <a:t>1. Go to www.sourcetreeapp.com</a:t>
+            </a:r>
+          </a:p>
+        </p:txBody>
+      </p:sp>
     </p:spTree>
     <p:extLst>
       <p:ext uri="{BB962C8B-B14F-4D97-AF65-F5344CB8AC3E}">
@@ -4065,6 +4382,39 @@
           </a:p>
         </p:txBody>
       </p:sp>
+      <p:sp>
+        <p:nvSpPr>
+          <p:cNvPr id="4" name="TextBox 3"/>
+          <p:cNvSpPr txBox="1"/>
+          <p:nvPr/>
+        </p:nvSpPr>
+        <p:spPr>
+          <a:xfrm>
+            <a:off x="3508131" y="6172200"/>
+            <a:ext cx="4172681" cy="461665"/>
+          </a:xfrm>
+          <a:prstGeom prst="rect">
+            <a:avLst/>
+          </a:prstGeom>
+          <a:noFill/>
+        </p:spPr>
+        <p:txBody>
+          <a:bodyPr wrap="none" rtlCol="0">
+            <a:spAutoFit/>
+          </a:bodyPr>
+          <a:lstStyle/>
+          <a:p>
+            <a:r>
+              <a:rPr lang="en-US" sz="2400" b="1" dirty="0">
+                <a:solidFill>
+                  <a:srgbClr val="FF0000"/>
+                </a:solidFill>
+              </a:rPr>
+              <a:t>2. Download the app (it’s free!)</a:t>
+            </a:r>
+          </a:p>
+        </p:txBody>
+      </p:sp>
     </p:spTree>
     <p:extLst>
       <p:ext uri="{BB962C8B-B14F-4D97-AF65-F5344CB8AC3E}">
@@ -4111,7 +4461,7 @@
         </p:blipFill>
         <p:spPr>
           <a:xfrm>
-            <a:off x="942974" y="886966"/>
+            <a:off x="916597" y="420974"/>
             <a:ext cx="10384747" cy="5570984"/>
           </a:xfrm>
           <a:prstGeom prst="rect">
@@ -4119,6 +4469,39 @@
           </a:prstGeom>
         </p:spPr>
       </p:pic>
+      <p:sp>
+        <p:nvSpPr>
+          <p:cNvPr id="3" name="TextBox 2"/>
+          <p:cNvSpPr txBox="1"/>
+          <p:nvPr/>
+        </p:nvSpPr>
+        <p:spPr>
+          <a:xfrm>
+            <a:off x="1940809" y="6145823"/>
+            <a:ext cx="8336321" cy="461665"/>
+          </a:xfrm>
+          <a:prstGeom prst="rect">
+            <a:avLst/>
+          </a:prstGeom>
+          <a:noFill/>
+        </p:spPr>
+        <p:txBody>
+          <a:bodyPr wrap="none" rtlCol="0">
+            <a:spAutoFit/>
+          </a:bodyPr>
+          <a:lstStyle/>
+          <a:p>
+            <a:r>
+              <a:rPr lang="en-US" sz="2400" b="1" dirty="0">
+                <a:solidFill>
+                  <a:srgbClr val="FF0000"/>
+                </a:solidFill>
+              </a:rPr>
+              <a:t>This is what you should see after you start downloading the app</a:t>
+            </a:r>
+          </a:p>
+        </p:txBody>
+      </p:sp>
     </p:spTree>
     <p:extLst>
       <p:ext uri="{BB962C8B-B14F-4D97-AF65-F5344CB8AC3E}">
@@ -4173,6 +4556,39 @@
           </a:prstGeom>
         </p:spPr>
       </p:pic>
+      <p:sp>
+        <p:nvSpPr>
+          <p:cNvPr id="3" name="TextBox 2"/>
+          <p:cNvSpPr txBox="1"/>
+          <p:nvPr/>
+        </p:nvSpPr>
+        <p:spPr>
+          <a:xfrm>
+            <a:off x="4519247" y="6184322"/>
+            <a:ext cx="2382319" cy="461665"/>
+          </a:xfrm>
+          <a:prstGeom prst="rect">
+            <a:avLst/>
+          </a:prstGeom>
+          <a:noFill/>
+        </p:spPr>
+        <p:txBody>
+          <a:bodyPr wrap="none" rtlCol="0">
+            <a:spAutoFit/>
+          </a:bodyPr>
+          <a:lstStyle/>
+          <a:p>
+            <a:r>
+              <a:rPr lang="en-US" sz="2400" b="1" dirty="0">
+                <a:solidFill>
+                  <a:srgbClr val="FF0000"/>
+                </a:solidFill>
+              </a:rPr>
+              <a:t>3. Install the app</a:t>
+            </a:r>
+          </a:p>
+        </p:txBody>
+      </p:sp>
     </p:spTree>
     <p:extLst>
       <p:ext uri="{BB962C8B-B14F-4D97-AF65-F5344CB8AC3E}">
@@ -4227,6 +4643,39 @@
           </a:prstGeom>
         </p:spPr>
       </p:pic>
+      <p:sp>
+        <p:nvSpPr>
+          <p:cNvPr id="4" name="TextBox 3"/>
+          <p:cNvSpPr txBox="1"/>
+          <p:nvPr/>
+        </p:nvSpPr>
+        <p:spPr>
+          <a:xfrm>
+            <a:off x="2135653" y="6189785"/>
+            <a:ext cx="7920694" cy="461665"/>
+          </a:xfrm>
+          <a:prstGeom prst="rect">
+            <a:avLst/>
+          </a:prstGeom>
+          <a:noFill/>
+        </p:spPr>
+        <p:txBody>
+          <a:bodyPr wrap="none" rtlCol="0">
+            <a:spAutoFit/>
+          </a:bodyPr>
+          <a:lstStyle/>
+          <a:p>
+            <a:r>
+              <a:rPr lang="en-US" sz="2400" b="1" dirty="0">
+                <a:solidFill>
+                  <a:srgbClr val="FF0000"/>
+                </a:solidFill>
+              </a:rPr>
+              <a:t>This is what you should see when you start installing the app</a:t>
+            </a:r>
+          </a:p>
+        </p:txBody>
+      </p:sp>
     </p:spTree>
     <p:extLst>
       <p:ext uri="{BB962C8B-B14F-4D97-AF65-F5344CB8AC3E}">
@@ -4281,6 +4730,39 @@
           </a:prstGeom>
         </p:spPr>
       </p:pic>
+      <p:sp>
+        <p:nvSpPr>
+          <p:cNvPr id="3" name="TextBox 2"/>
+          <p:cNvSpPr txBox="1"/>
+          <p:nvPr/>
+        </p:nvSpPr>
+        <p:spPr>
+          <a:xfrm>
+            <a:off x="3508131" y="6172200"/>
+            <a:ext cx="4480714" cy="461665"/>
+          </a:xfrm>
+          <a:prstGeom prst="rect">
+            <a:avLst/>
+          </a:prstGeom>
+          <a:noFill/>
+        </p:spPr>
+        <p:txBody>
+          <a:bodyPr wrap="none" rtlCol="0">
+            <a:spAutoFit/>
+          </a:bodyPr>
+          <a:lstStyle/>
+          <a:p>
+            <a:r>
+              <a:rPr lang="en-US" sz="2400" b="1" dirty="0">
+                <a:solidFill>
+                  <a:srgbClr val="FF0000"/>
+                </a:solidFill>
+              </a:rPr>
+              <a:t>4. Agree to the license agreement</a:t>
+            </a:r>
+          </a:p>
+        </p:txBody>
+      </p:sp>
     </p:spTree>
     <p:extLst>
       <p:ext uri="{BB962C8B-B14F-4D97-AF65-F5344CB8AC3E}">
@@ -4424,6 +4906,39 @@
           <a:p>
             <a:pPr algn="ctr"/>
             <a:endParaRPr lang="en-US"/>
+          </a:p>
+        </p:txBody>
+      </p:sp>
+      <p:sp>
+        <p:nvSpPr>
+          <p:cNvPr id="5" name="TextBox 4"/>
+          <p:cNvSpPr txBox="1"/>
+          <p:nvPr/>
+        </p:nvSpPr>
+        <p:spPr>
+          <a:xfrm>
+            <a:off x="4120331" y="6137031"/>
+            <a:ext cx="2578270" cy="461665"/>
+          </a:xfrm>
+          <a:prstGeom prst="rect">
+            <a:avLst/>
+          </a:prstGeom>
+          <a:noFill/>
+        </p:spPr>
+        <p:txBody>
+          <a:bodyPr wrap="none" rtlCol="0">
+            <a:spAutoFit/>
+          </a:bodyPr>
+          <a:lstStyle/>
+          <a:p>
+            <a:r>
+              <a:rPr lang="en-US" sz="2400" b="1" dirty="0">
+                <a:solidFill>
+                  <a:srgbClr val="FF0000"/>
+                </a:solidFill>
+              </a:rPr>
+              <a:t>5. Click “Continue”</a:t>
+            </a:r>
           </a:p>
         </p:txBody>
       </p:sp>

</xml_diff>